<commit_message>
Updating slides for lesson 3
</commit_message>
<xml_diff>
--- a/companion-website/public/files/3. Ambassadors for Christ.pptx
+++ b/companion-website/public/files/3. Ambassadors for Christ.pptx
@@ -222,7 +222,7 @@
           <a:p>
             <a:fld id="{8F7EB338-8BB0-B64B-9F79-C87EA24D723F}" type="datetimeFigureOut">
               <a:rPr lang="en-US" smtClean="0"/>
-              <a:t>10/13/20</a:t>
+              <a:t>4/21/21</a:t>
             </a:fld>
             <a:endParaRPr lang="en-US"/>
           </a:p>
@@ -925,7 +925,7 @@
             <a:fld id="{DBE77699-C466-4996-ADED-71C8160E04A2}" type="datetimeFigureOut">
               <a:rPr lang="en-US" smtClean="0"/>
               <a:pPr/>
-              <a:t>10/13/20</a:t>
+              <a:t>4/21/21</a:t>
             </a:fld>
             <a:endParaRPr lang="en-US"/>
           </a:p>
@@ -1090,7 +1090,7 @@
             <a:fld id="{DBE77699-C466-4996-ADED-71C8160E04A2}" type="datetimeFigureOut">
               <a:rPr lang="en-US" smtClean="0"/>
               <a:pPr/>
-              <a:t>10/13/20</a:t>
+              <a:t>4/21/21</a:t>
             </a:fld>
             <a:endParaRPr lang="en-US"/>
           </a:p>
@@ -1265,7 +1265,7 @@
             <a:fld id="{DBE77699-C466-4996-ADED-71C8160E04A2}" type="datetimeFigureOut">
               <a:rPr lang="en-US" smtClean="0"/>
               <a:pPr/>
-              <a:t>10/13/20</a:t>
+              <a:t>4/21/21</a:t>
             </a:fld>
             <a:endParaRPr lang="en-US"/>
           </a:p>
@@ -1384,7 +1384,7 @@
             <a:fld id="{DBE77699-C466-4996-ADED-71C8160E04A2}" type="datetimeFigureOut">
               <a:rPr lang="en-US" smtClean="0"/>
               <a:pPr/>
-              <a:t>10/13/20</a:t>
+              <a:t>4/21/21</a:t>
             </a:fld>
             <a:endParaRPr lang="en-US"/>
           </a:p>
@@ -1806,7 +1806,7 @@
             <a:fld id="{DBE77699-C466-4996-ADED-71C8160E04A2}" type="datetimeFigureOut">
               <a:rPr lang="en-US" smtClean="0"/>
               <a:pPr/>
-              <a:t>10/13/20</a:t>
+              <a:t>4/21/21</a:t>
             </a:fld>
             <a:endParaRPr lang="en-US"/>
           </a:p>
@@ -2015,7 +2015,7 @@
             <a:fld id="{DBE77699-C466-4996-ADED-71C8160E04A2}" type="datetimeFigureOut">
               <a:rPr lang="en-US" smtClean="0"/>
               <a:pPr/>
-              <a:t>10/13/20</a:t>
+              <a:t>4/21/21</a:t>
             </a:fld>
             <a:endParaRPr lang="en-US"/>
           </a:p>
@@ -2257,7 +2257,7 @@
             <a:fld id="{DBE77699-C466-4996-ADED-71C8160E04A2}" type="datetimeFigureOut">
               <a:rPr lang="en-US" smtClean="0"/>
               <a:pPr/>
-              <a:t>10/13/20</a:t>
+              <a:t>4/21/21</a:t>
             </a:fld>
             <a:endParaRPr lang="en-US"/>
           </a:p>
@@ -2539,7 +2539,7 @@
             <a:fld id="{DBE77699-C466-4996-ADED-71C8160E04A2}" type="datetimeFigureOut">
               <a:rPr lang="en-US" smtClean="0"/>
               <a:pPr/>
-              <a:t>10/13/20</a:t>
+              <a:t>4/21/21</a:t>
             </a:fld>
             <a:endParaRPr lang="en-US"/>
           </a:p>
@@ -2955,7 +2955,7 @@
             <a:fld id="{DBE77699-C466-4996-ADED-71C8160E04A2}" type="datetimeFigureOut">
               <a:rPr lang="en-US" smtClean="0"/>
               <a:pPr/>
-              <a:t>10/13/20</a:t>
+              <a:t>4/21/21</a:t>
             </a:fld>
             <a:endParaRPr lang="en-US"/>
           </a:p>
@@ -3069,7 +3069,7 @@
             <a:fld id="{DBE77699-C466-4996-ADED-71C8160E04A2}" type="datetimeFigureOut">
               <a:rPr lang="en-US" smtClean="0"/>
               <a:pPr/>
-              <a:t>10/13/20</a:t>
+              <a:t>4/21/21</a:t>
             </a:fld>
             <a:endParaRPr lang="en-US"/>
           </a:p>
@@ -3161,7 +3161,7 @@
             <a:fld id="{DBE77699-C466-4996-ADED-71C8160E04A2}" type="datetimeFigureOut">
               <a:rPr lang="en-US" smtClean="0"/>
               <a:pPr/>
-              <a:t>10/13/20</a:t>
+              <a:t>4/21/21</a:t>
             </a:fld>
             <a:endParaRPr lang="en-US"/>
           </a:p>
@@ -3433,7 +3433,7 @@
             <a:fld id="{DBE77699-C466-4996-ADED-71C8160E04A2}" type="datetimeFigureOut">
               <a:rPr lang="en-US" smtClean="0"/>
               <a:pPr/>
-              <a:t>10/13/20</a:t>
+              <a:t>4/21/21</a:t>
             </a:fld>
             <a:endParaRPr lang="en-US"/>
           </a:p>
@@ -3682,7 +3682,7 @@
             <a:fld id="{DBE77699-C466-4996-ADED-71C8160E04A2}" type="datetimeFigureOut">
               <a:rPr lang="en-US" smtClean="0"/>
               <a:pPr/>
-              <a:t>10/13/20</a:t>
+              <a:t>4/21/21</a:t>
             </a:fld>
             <a:endParaRPr lang="en-US"/>
           </a:p>
@@ -3893,7 +3893,7 @@
             <a:fld id="{DBE77699-C466-4996-ADED-71C8160E04A2}" type="datetimeFigureOut">
               <a:rPr lang="en-US" smtClean="0"/>
               <a:pPr/>
-              <a:t>10/13/20</a:t>
+              <a:t>4/21/21</a:t>
             </a:fld>
             <a:endParaRPr lang="en-US"/>
           </a:p>
@@ -5473,7 +5473,7 @@
           <a:p>
             <a:r>
               <a:rPr lang="en-US" dirty="0"/>
-              <a:t>5</a:t>
+              <a:t>4</a:t>
             </a:r>
           </a:p>
         </p:txBody>
@@ -5549,7 +5549,7 @@
           <a:p>
             <a:r>
               <a:rPr lang="en-US" dirty="0"/>
-              <a:t>6</a:t>
+              <a:t>5</a:t>
             </a:r>
           </a:p>
         </p:txBody>
@@ -6254,7 +6254,7 @@
           <a:p>
             <a:r>
               <a:rPr lang="en-US" dirty="0"/>
-              <a:t>7</a:t>
+              <a:t>6</a:t>
             </a:r>
           </a:p>
         </p:txBody>
@@ -8548,10 +8548,14 @@
           <a:bodyPr/>
           <a:lstStyle/>
           <a:p>
-            <a:r>
-              <a:rPr lang="en-US" dirty="0"/>
-              <a:t>1</a:t>
-            </a:r>
+            <a:pPr marL="0" indent="0" algn="l" defTabSz="914400" rtl="0" eaLnBrk="1" latinLnBrk="0" hangingPunct="1">
+              <a:spcBef>
+                <a:spcPct val="20000"/>
+              </a:spcBef>
+              <a:buFont typeface="Arial" pitchFamily="34" charset="0"/>
+              <a:buNone/>
+            </a:pPr>
+            <a:endParaRPr lang="en-US" dirty="0"/>
           </a:p>
         </p:txBody>
       </p:sp>
@@ -8626,7 +8630,7 @@
           <a:p>
             <a:r>
               <a:rPr lang="en-US" dirty="0"/>
-              <a:t>2</a:t>
+              <a:t>1</a:t>
             </a:r>
           </a:p>
         </p:txBody>
@@ -8702,7 +8706,7 @@
           <a:p>
             <a:r>
               <a:rPr lang="en-US" dirty="0"/>
-              <a:t>3</a:t>
+              <a:t>2</a:t>
             </a:r>
           </a:p>
         </p:txBody>
@@ -8778,7 +8782,7 @@
           <a:p>
             <a:r>
               <a:rPr lang="en-US" dirty="0"/>
-              <a:t>4</a:t>
+              <a:t>3</a:t>
             </a:r>
           </a:p>
         </p:txBody>

</xml_diff>